<commit_message>
Fix connect to FTP Server
</commit_message>
<xml_diff>
--- a/MediaTinLanh.UI/Files/template.pptx
+++ b/MediaTinLanh.UI/Files/template.pptx
@@ -5,16 +5,17 @@
     <p:sldMasterId id="2147483648" r:id="rId1"/>
   </p:sldMasterIdLst>
   <p:sldIdLst>
-    <p:sldId id="256" r:id="rId6"/>
-    <p:sldId id="257" r:id="rId7"/>
+    <p:sldId id="256" r:id="rId2"/>
+    <p:sldId id="257" r:id="rId3"/>
+    <p:sldId id="258" r:id="rId4"/>
   </p:sldIdLst>
-  <p:sldSz cx="12192000" cy="6858000" type="screen4x3"/>
+  <p:sldSz cx="12192000" cy="6858000"/>
   <p:notesSz cx="6858000" cy="9144000"/>
   <p:defaultTextStyle>
     <a:defPPr defTabSz="914400">
       <a:defRPr lang="en-US" dirty="0"/>
     </a:defPPr>
-    <a:lvl1pPr marL="0" rtl="0" algn="l" defTabSz="914400">
+    <a:lvl1pPr marL="0" algn="l" defTabSz="914400" rtl="0">
       <a:defRPr sz="1800" kern="1200" dirty="0">
         <a:solidFill>
           <a:schemeClr val="tx1"/>
@@ -23,7 +24,7 @@
         <a:ea typeface="+mn-ea"/>
       </a:defRPr>
     </a:lvl1pPr>
-    <a:lvl2pPr marL="457200" rtl="0" algn="l" defTabSz="914400">
+    <a:lvl2pPr marL="457200" algn="l" defTabSz="914400" rtl="0">
       <a:defRPr sz="1800" kern="1200" dirty="0">
         <a:solidFill>
           <a:schemeClr val="tx1"/>
@@ -32,7 +33,7 @@
         <a:ea typeface="+mn-ea"/>
       </a:defRPr>
     </a:lvl2pPr>
-    <a:lvl3pPr marL="914400" rtl="0" algn="l" defTabSz="914400">
+    <a:lvl3pPr marL="914400" algn="l" defTabSz="914400" rtl="0">
       <a:defRPr sz="1800" kern="1200" dirty="0">
         <a:solidFill>
           <a:schemeClr val="tx1"/>
@@ -41,7 +42,7 @@
         <a:ea typeface="+mn-ea"/>
       </a:defRPr>
     </a:lvl3pPr>
-    <a:lvl4pPr marL="1371600" rtl="0" algn="l" defTabSz="914400">
+    <a:lvl4pPr marL="1371600" algn="l" defTabSz="914400" rtl="0">
       <a:defRPr sz="1800" kern="1200" dirty="0">
         <a:solidFill>
           <a:schemeClr val="tx1"/>
@@ -50,7 +51,7 @@
         <a:ea typeface="+mn-ea"/>
       </a:defRPr>
     </a:lvl4pPr>
-    <a:lvl5pPr marL="1828800" rtl="0" algn="l" defTabSz="914400">
+    <a:lvl5pPr marL="1828800" algn="l" defTabSz="914400" rtl="0">
       <a:defRPr sz="1800" kern="1200" dirty="0">
         <a:solidFill>
           <a:schemeClr val="tx1"/>
@@ -59,7 +60,7 @@
         <a:ea typeface="+mn-ea"/>
       </a:defRPr>
     </a:lvl5pPr>
-    <a:lvl6pPr marL="2286000" rtl="0" algn="l" defTabSz="914400">
+    <a:lvl6pPr marL="2286000" algn="l" defTabSz="914400" rtl="0">
       <a:defRPr sz="1800" kern="1200" dirty="0">
         <a:solidFill>
           <a:schemeClr val="tx1"/>
@@ -68,7 +69,7 @@
         <a:ea typeface="+mn-ea"/>
       </a:defRPr>
     </a:lvl6pPr>
-    <a:lvl7pPr marL="2743200" rtl="0" algn="l" defTabSz="914400">
+    <a:lvl7pPr marL="2743200" algn="l" defTabSz="914400" rtl="0">
       <a:defRPr sz="1800" kern="1200" dirty="0">
         <a:solidFill>
           <a:schemeClr val="tx1"/>
@@ -77,7 +78,7 @@
         <a:ea typeface="+mn-ea"/>
       </a:defRPr>
     </a:lvl7pPr>
-    <a:lvl8pPr marL="3200400" rtl="0" algn="l" defTabSz="914400">
+    <a:lvl8pPr marL="3200400" algn="l" defTabSz="914400" rtl="0">
       <a:defRPr sz="1800" kern="1200" dirty="0">
         <a:solidFill>
           <a:schemeClr val="tx1"/>
@@ -86,7 +87,7 @@
         <a:ea typeface="+mn-ea"/>
       </a:defRPr>
     </a:lvl8pPr>
-    <a:lvl9pPr marL="3657600" rtl="0" algn="l" defTabSz="914400">
+    <a:lvl9pPr marL="3657600" algn="l" defTabSz="914400" rtl="0">
       <a:defRPr sz="1800" kern="1200" dirty="0">
         <a:solidFill>
           <a:schemeClr val="tx1"/>
@@ -97,13 +98,11 @@
     </a:lvl9pPr>
   </p:defaultTextStyle>
   <p:extLst>
-    <p:ext uri="{521415D9-36F7-43E2-AB2F-B90AF26B5E84}"/>
+    <p:ext uri="{EFAFB233-063F-42B5-8137-9DF3F51BA10A}">
+      <p15:sldGuideLst xmlns:p15="http://schemas.microsoft.com/office/powerpoint/2012/main"/>
+    </p:ext>
   </p:extLst>
 </p:presentation>
-</file>
-
-<file path=ppt/commentAuthors.xml><?xml version="1.0" encoding="utf-8"?>
-<p:cmAuthorLst xmlns:a="http://schemas.openxmlformats.org/drawingml/2006/main" xmlns:r="http://schemas.openxmlformats.org/officeDocument/2006/relationships" xmlns:p="http://schemas.openxmlformats.org/presentationml/2006/main"/>
 </file>
 
 <file path=ppt/slideLayouts/slideLayout1.xml><?xml version="1.0" encoding="utf-8"?>
@@ -144,19 +143,17 @@
           </a:ln>
         </p:spPr>
         <p:txBody>
-          <a:bodyPr anchor="b" wrap="square"/>
+          <a:bodyPr wrap="square" anchor="b"/>
           <a:lstStyle>
             <a:lvl1pPr algn="ctr">
               <a:defRPr sz="6000" dirty="0"/>
             </a:lvl1pPr>
           </a:lstStyle>
           <a:p>
-            <a:pPr/>
             <a:r>
               <a:rPr lang="en-US" dirty="0"/>
               <a:t>Click to edit Master title style</a:t>
             </a:r>
-            <a:endParaRPr lang="en-US" dirty="0"/>
           </a:p>
         </p:txBody>
       </p:sp>
@@ -221,12 +218,10 @@
             </a:lvl9pPr>
           </a:lstStyle>
           <a:p>
-            <a:pPr/>
             <a:r>
               <a:rPr lang="en-US" dirty="0"/>
               <a:t>Click to edit Master subtitle style</a:t>
             </a:r>
-            <a:endParaRPr lang="en-US" dirty="0"/>
           </a:p>
         </p:txBody>
       </p:sp>
@@ -250,10 +245,9 @@
           <a:bodyPr wrap="square"/>
           <a:lstStyle/>
           <a:p>
-            <a:pPr/>
             <a:fld id="{D4630D1D-EC81-4D12-BBAE-7AD5C46FE905}" type="datetimeFigureOut">
               <a:rPr lang="en-US" dirty="0"/>
-              <a:t>7/8/2015</a:t>
+              <a:t>5/12/2021</a:t>
             </a:fld>
             <a:endParaRPr lang="en-US" dirty="0"/>
           </a:p>
@@ -279,7 +273,6 @@
           <a:bodyPr wrap="square"/>
           <a:lstStyle/>
           <a:p>
-            <a:pPr/>
             <a:endParaRPr lang="en-US" dirty="0"/>
           </a:p>
         </p:txBody>
@@ -304,7 +297,6 @@
           <a:bodyPr wrap="square"/>
           <a:lstStyle/>
           <a:p>
-            <a:pPr/>
             <a:fld id="{E1CC4C9C-B29E-4E68-9F89-CA7A1621DE94}" type="slidenum">
               <a:rPr lang="en-US" dirty="0"/>
               <a:t>‹#›</a:t>
@@ -358,12 +350,10 @@
           <a:bodyPr wrap="square"/>
           <a:lstStyle/>
           <a:p>
-            <a:pPr/>
             <a:r>
               <a:rPr lang="en-US" dirty="0"/>
               <a:t>Click to edit Master title style</a:t>
             </a:r>
-            <a:endParaRPr lang="en-US" dirty="0"/>
           </a:p>
         </p:txBody>
       </p:sp>
@@ -387,7 +377,6 @@
           <a:bodyPr vert="eaVert" wrap="square"/>
           <a:lstStyle/>
           <a:p>
-            <a:pPr/>
             <a:r>
               <a:rPr lang="en-US" dirty="0"/>
               <a:t>Click to edit Master text styles</a:t>
@@ -420,7 +409,6 @@
               <a:rPr lang="en-US" dirty="0"/>
               <a:t>Fifth level</a:t>
             </a:r>
-            <a:endParaRPr lang="en-US" dirty="0"/>
           </a:p>
         </p:txBody>
       </p:sp>
@@ -444,10 +432,9 @@
           <a:bodyPr wrap="square"/>
           <a:lstStyle/>
           <a:p>
-            <a:pPr/>
             <a:fld id="{D4630D1D-EC81-4D12-BBAE-7AD5C46FE905}" type="datetimeFigureOut">
               <a:rPr lang="en-US" dirty="0"/>
-              <a:t>7/8/2015</a:t>
+              <a:t>5/12/2021</a:t>
             </a:fld>
             <a:endParaRPr lang="en-US" dirty="0"/>
           </a:p>
@@ -473,7 +460,6 @@
           <a:bodyPr wrap="square"/>
           <a:lstStyle/>
           <a:p>
-            <a:pPr/>
             <a:endParaRPr lang="en-US" dirty="0"/>
           </a:p>
         </p:txBody>
@@ -498,7 +484,6 @@
           <a:bodyPr wrap="square"/>
           <a:lstStyle/>
           <a:p>
-            <a:pPr/>
             <a:fld id="{E1CC4C9C-B29E-4E68-9F89-CA7A1621DE94}" type="slidenum">
               <a:rPr lang="en-US" dirty="0"/>
               <a:t>‹#›</a:t>
@@ -556,12 +541,10 @@
           <a:bodyPr vert="eaVert" wrap="square"/>
           <a:lstStyle/>
           <a:p>
-            <a:pPr/>
             <a:r>
               <a:rPr lang="en-US" dirty="0"/>
               <a:t>Click to edit Master title style</a:t>
             </a:r>
-            <a:endParaRPr lang="en-US" dirty="0"/>
           </a:p>
         </p:txBody>
       </p:sp>
@@ -589,7 +572,6 @@
           <a:bodyPr vert="eaVert" wrap="square"/>
           <a:lstStyle/>
           <a:p>
-            <a:pPr/>
             <a:r>
               <a:rPr lang="en-US" dirty="0"/>
               <a:t>Click to edit Master text styles</a:t>
@@ -622,7 +604,6 @@
               <a:rPr lang="en-US" dirty="0"/>
               <a:t>Fifth level</a:t>
             </a:r>
-            <a:endParaRPr lang="en-US" dirty="0"/>
           </a:p>
         </p:txBody>
       </p:sp>
@@ -646,10 +627,9 @@
           <a:bodyPr wrap="square"/>
           <a:lstStyle/>
           <a:p>
-            <a:pPr/>
             <a:fld id="{D4630D1D-EC81-4D12-BBAE-7AD5C46FE905}" type="datetimeFigureOut">
               <a:rPr lang="en-US" dirty="0"/>
-              <a:t>7/8/2015</a:t>
+              <a:t>5/12/2021</a:t>
             </a:fld>
             <a:endParaRPr lang="en-US" dirty="0"/>
           </a:p>
@@ -675,7 +655,6 @@
           <a:bodyPr wrap="square"/>
           <a:lstStyle/>
           <a:p>
-            <a:pPr/>
             <a:endParaRPr lang="en-US" dirty="0"/>
           </a:p>
         </p:txBody>
@@ -700,7 +679,6 @@
           <a:bodyPr wrap="square"/>
           <a:lstStyle/>
           <a:p>
-            <a:pPr/>
             <a:fld id="{E1CC4C9C-B29E-4E68-9F89-CA7A1621DE94}" type="slidenum">
               <a:rPr lang="en-US" dirty="0"/>
               <a:t>‹#›</a:t>
@@ -717,7 +695,7 @@
 </p:sldLayout>
 </file>
 
-<file path=ppt/slideLayouts/slideLayout13.xml><?xml version="1.0" encoding="utf-8"?>
+<file path=ppt/slideLayouts/slideLayout12.xml><?xml version="1.0" encoding="utf-8"?>
 <p:sldLayout xmlns:a="http://schemas.openxmlformats.org/drawingml/2006/main" xmlns:r="http://schemas.openxmlformats.org/officeDocument/2006/relationships" xmlns:p="http://schemas.openxmlformats.org/presentationml/2006/main">
   <p:cSld name="CustomLayout">
     <p:spTree>
@@ -752,7 +730,7 @@
           </a:stretch>
         </p:blipFill>
         <p:spPr bwMode="white">
-          <a:xfrm rot="0">
+          <a:xfrm>
             <a:off x="0" y="0"/>
             <a:ext cx="12192000" cy="6858000"/>
           </a:xfrm>
@@ -810,12 +788,10 @@
           <a:bodyPr wrap="square"/>
           <a:lstStyle/>
           <a:p>
-            <a:pPr/>
             <a:r>
               <a:rPr lang="en-US" dirty="0"/>
               <a:t>Click to edit Master title style</a:t>
             </a:r>
-            <a:endParaRPr lang="en-US" dirty="0"/>
           </a:p>
         </p:txBody>
       </p:sp>
@@ -839,7 +815,6 @@
           <a:bodyPr wrap="square"/>
           <a:lstStyle/>
           <a:p>
-            <a:pPr/>
             <a:r>
               <a:rPr lang="en-US" dirty="0"/>
               <a:t>Click to edit Master text styles</a:t>
@@ -872,7 +847,6 @@
               <a:rPr lang="en-US" dirty="0"/>
               <a:t>Fifth level</a:t>
             </a:r>
-            <a:endParaRPr lang="en-US" dirty="0"/>
           </a:p>
         </p:txBody>
       </p:sp>
@@ -896,10 +870,9 @@
           <a:bodyPr wrap="square"/>
           <a:lstStyle/>
           <a:p>
-            <a:pPr/>
             <a:fld id="{D4630D1D-EC81-4D12-BBAE-7AD5C46FE905}" type="datetimeFigureOut">
               <a:rPr lang="en-US" dirty="0"/>
-              <a:t>7/8/2015</a:t>
+              <a:t>5/12/2021</a:t>
             </a:fld>
             <a:endParaRPr lang="en-US" dirty="0"/>
           </a:p>
@@ -925,7 +898,6 @@
           <a:bodyPr wrap="square"/>
           <a:lstStyle/>
           <a:p>
-            <a:pPr/>
             <a:endParaRPr lang="en-US" dirty="0"/>
           </a:p>
         </p:txBody>
@@ -950,7 +922,6 @@
           <a:bodyPr wrap="square"/>
           <a:lstStyle/>
           <a:p>
-            <a:pPr/>
             <a:fld id="{E1CC4C9C-B29E-4E68-9F89-CA7A1621DE94}" type="slidenum">
               <a:rPr lang="en-US" dirty="0"/>
               <a:t>‹#›</a:t>
@@ -1005,19 +976,17 @@
           </a:ln>
         </p:spPr>
         <p:txBody>
-          <a:bodyPr anchor="b" wrap="square"/>
+          <a:bodyPr wrap="square" anchor="b"/>
           <a:lstStyle>
             <a:lvl1pPr>
               <a:defRPr sz="6000" dirty="0"/>
             </a:lvl1pPr>
           </a:lstStyle>
           <a:p>
-            <a:pPr/>
             <a:r>
               <a:rPr lang="en-US" dirty="0"/>
               <a:t>Click to edit Master title style</a:t>
             </a:r>
-            <a:endParaRPr lang="en-US" dirty="0"/>
           </a:p>
         </p:txBody>
       </p:sp>
@@ -1136,7 +1105,6 @@
             </a:lvl9pPr>
           </a:lstStyle>
           <a:p>
-            <a:pPr/>
             <a:r>
               <a:rPr lang="en-US" dirty="0"/>
               <a:t>Click to edit Master text styles</a:t>
@@ -1164,10 +1132,9 @@
           <a:bodyPr wrap="square"/>
           <a:lstStyle/>
           <a:p>
-            <a:pPr/>
             <a:fld id="{D4630D1D-EC81-4D12-BBAE-7AD5C46FE905}" type="datetimeFigureOut">
               <a:rPr lang="en-US" dirty="0"/>
-              <a:t>7/8/2015</a:t>
+              <a:t>5/12/2021</a:t>
             </a:fld>
             <a:endParaRPr lang="en-US" dirty="0"/>
           </a:p>
@@ -1193,7 +1160,6 @@
           <a:bodyPr wrap="square"/>
           <a:lstStyle/>
           <a:p>
-            <a:pPr/>
             <a:endParaRPr lang="en-US" dirty="0"/>
           </a:p>
         </p:txBody>
@@ -1218,7 +1184,6 @@
           <a:bodyPr wrap="square"/>
           <a:lstStyle/>
           <a:p>
-            <a:pPr/>
             <a:fld id="{E1CC4C9C-B29E-4E68-9F89-CA7A1621DE94}" type="slidenum">
               <a:rPr lang="en-US" dirty="0"/>
               <a:t>‹#›</a:t>
@@ -1272,12 +1237,10 @@
           <a:bodyPr wrap="square"/>
           <a:lstStyle/>
           <a:p>
-            <a:pPr/>
             <a:r>
               <a:rPr lang="en-US" dirty="0"/>
               <a:t>Click to edit Master title style</a:t>
             </a:r>
-            <a:endParaRPr lang="en-US" dirty="0"/>
           </a:p>
         </p:txBody>
       </p:sp>
@@ -1305,7 +1268,6 @@
           <a:bodyPr wrap="square"/>
           <a:lstStyle/>
           <a:p>
-            <a:pPr/>
             <a:r>
               <a:rPr lang="en-US" dirty="0"/>
               <a:t>Click to edit Master text styles</a:t>
@@ -1338,7 +1300,6 @@
               <a:rPr lang="en-US" dirty="0"/>
               <a:t>Fifth level</a:t>
             </a:r>
-            <a:endParaRPr lang="en-US" dirty="0"/>
           </a:p>
         </p:txBody>
       </p:sp>
@@ -1366,7 +1327,6 @@
           <a:bodyPr wrap="square"/>
           <a:lstStyle/>
           <a:p>
-            <a:pPr/>
             <a:r>
               <a:rPr lang="en-US" dirty="0"/>
               <a:t>Click to edit Master text styles</a:t>
@@ -1399,7 +1359,6 @@
               <a:rPr lang="en-US" dirty="0"/>
               <a:t>Fifth level</a:t>
             </a:r>
-            <a:endParaRPr lang="en-US" dirty="0"/>
           </a:p>
         </p:txBody>
       </p:sp>
@@ -1423,10 +1382,9 @@
           <a:bodyPr wrap="square"/>
           <a:lstStyle/>
           <a:p>
-            <a:pPr/>
             <a:fld id="{D4630D1D-EC81-4D12-BBAE-7AD5C46FE905}" type="datetimeFigureOut">
               <a:rPr lang="en-US" dirty="0"/>
-              <a:t>7/8/2015</a:t>
+              <a:t>5/12/2021</a:t>
             </a:fld>
             <a:endParaRPr lang="en-US" dirty="0"/>
           </a:p>
@@ -1452,7 +1410,6 @@
           <a:bodyPr wrap="square"/>
           <a:lstStyle/>
           <a:p>
-            <a:pPr/>
             <a:endParaRPr lang="en-US" dirty="0"/>
           </a:p>
         </p:txBody>
@@ -1477,7 +1434,6 @@
           <a:bodyPr wrap="square"/>
           <a:lstStyle/>
           <a:p>
-            <a:pPr/>
             <a:fld id="{E1CC4C9C-B29E-4E68-9F89-CA7A1621DE94}" type="slidenum">
               <a:rPr lang="en-US" dirty="0"/>
               <a:t>‹#›</a:t>
@@ -1535,12 +1491,10 @@
           <a:bodyPr wrap="square"/>
           <a:lstStyle/>
           <a:p>
-            <a:pPr/>
             <a:r>
               <a:rPr lang="en-US" dirty="0"/>
               <a:t>Click to edit Master title style</a:t>
             </a:r>
-            <a:endParaRPr lang="en-US" dirty="0"/>
           </a:p>
         </p:txBody>
       </p:sp>
@@ -1565,7 +1519,7 @@
           </a:ln>
         </p:spPr>
         <p:txBody>
-          <a:bodyPr anchor="b" wrap="square"/>
+          <a:bodyPr wrap="square" anchor="b"/>
           <a:lstStyle>
             <a:lvl1pPr marL="0" indent="0">
               <a:buNone/>
@@ -1605,7 +1559,6 @@
             </a:lvl9pPr>
           </a:lstStyle>
           <a:p>
-            <a:pPr/>
             <a:r>
               <a:rPr lang="en-US" dirty="0"/>
               <a:t>Click to edit Master text styles</a:t>
@@ -1637,7 +1590,6 @@
           <a:bodyPr wrap="square"/>
           <a:lstStyle/>
           <a:p>
-            <a:pPr/>
             <a:r>
               <a:rPr lang="en-US" dirty="0"/>
               <a:t>Click to edit Master text styles</a:t>
@@ -1670,7 +1622,6 @@
               <a:rPr lang="en-US" dirty="0"/>
               <a:t>Fifth level</a:t>
             </a:r>
-            <a:endParaRPr lang="en-US" dirty="0"/>
           </a:p>
         </p:txBody>
       </p:sp>
@@ -1695,7 +1646,7 @@
           </a:ln>
         </p:spPr>
         <p:txBody>
-          <a:bodyPr anchor="b" wrap="square"/>
+          <a:bodyPr wrap="square" anchor="b"/>
           <a:lstStyle>
             <a:lvl1pPr marL="0" indent="0">
               <a:buNone/>
@@ -1735,7 +1686,6 @@
             </a:lvl9pPr>
           </a:lstStyle>
           <a:p>
-            <a:pPr/>
             <a:r>
               <a:rPr lang="en-US" dirty="0"/>
               <a:t>Click to edit Master text styles</a:t>
@@ -1767,7 +1717,6 @@
           <a:bodyPr wrap="square"/>
           <a:lstStyle/>
           <a:p>
-            <a:pPr/>
             <a:r>
               <a:rPr lang="en-US" dirty="0"/>
               <a:t>Click to edit Master text styles</a:t>
@@ -1800,7 +1749,6 @@
               <a:rPr lang="en-US" dirty="0"/>
               <a:t>Fifth level</a:t>
             </a:r>
-            <a:endParaRPr lang="en-US" dirty="0"/>
           </a:p>
         </p:txBody>
       </p:sp>
@@ -1824,10 +1772,9 @@
           <a:bodyPr wrap="square"/>
           <a:lstStyle/>
           <a:p>
-            <a:pPr/>
             <a:fld id="{D4630D1D-EC81-4D12-BBAE-7AD5C46FE905}" type="datetimeFigureOut">
               <a:rPr lang="en-US" dirty="0"/>
-              <a:t>7/8/2015</a:t>
+              <a:t>5/12/2021</a:t>
             </a:fld>
             <a:endParaRPr lang="en-US" dirty="0"/>
           </a:p>
@@ -1853,7 +1800,6 @@
           <a:bodyPr wrap="square"/>
           <a:lstStyle/>
           <a:p>
-            <a:pPr/>
             <a:endParaRPr lang="en-US" dirty="0"/>
           </a:p>
         </p:txBody>
@@ -1878,7 +1824,6 @@
           <a:bodyPr wrap="square"/>
           <a:lstStyle/>
           <a:p>
-            <a:pPr/>
             <a:fld id="{E1CC4C9C-B29E-4E68-9F89-CA7A1621DE94}" type="slidenum">
               <a:rPr lang="en-US" dirty="0"/>
               <a:t>‹#›</a:t>
@@ -1932,12 +1877,10 @@
           <a:bodyPr wrap="square"/>
           <a:lstStyle/>
           <a:p>
-            <a:pPr/>
             <a:r>
               <a:rPr lang="en-US" dirty="0"/>
               <a:t>Click to edit Master title style</a:t>
             </a:r>
-            <a:endParaRPr lang="en-US" dirty="0"/>
           </a:p>
         </p:txBody>
       </p:sp>
@@ -1961,10 +1904,9 @@
           <a:bodyPr wrap="square"/>
           <a:lstStyle/>
           <a:p>
-            <a:pPr/>
             <a:fld id="{D4630D1D-EC81-4D12-BBAE-7AD5C46FE905}" type="datetimeFigureOut">
               <a:rPr lang="en-US" dirty="0"/>
-              <a:t>7/8/2015</a:t>
+              <a:t>5/12/2021</a:t>
             </a:fld>
             <a:endParaRPr lang="en-US" dirty="0"/>
           </a:p>
@@ -1990,7 +1932,6 @@
           <a:bodyPr wrap="square"/>
           <a:lstStyle/>
           <a:p>
-            <a:pPr/>
             <a:endParaRPr lang="en-US" dirty="0"/>
           </a:p>
         </p:txBody>
@@ -2015,7 +1956,6 @@
           <a:bodyPr wrap="square"/>
           <a:lstStyle/>
           <a:p>
-            <a:pPr/>
             <a:fld id="{E1CC4C9C-B29E-4E68-9F89-CA7A1621DE94}" type="slidenum">
               <a:rPr lang="en-US" dirty="0"/>
               <a:t>‹#›</a:t>
@@ -2069,10 +2009,9 @@
           <a:bodyPr wrap="square"/>
           <a:lstStyle/>
           <a:p>
-            <a:pPr/>
             <a:fld id="{D4630D1D-EC81-4D12-BBAE-7AD5C46FE905}" type="datetimeFigureOut">
               <a:rPr lang="en-US" dirty="0"/>
-              <a:t>7/8/2015</a:t>
+              <a:t>5/12/2021</a:t>
             </a:fld>
             <a:endParaRPr lang="en-US" dirty="0"/>
           </a:p>
@@ -2098,7 +2037,6 @@
           <a:bodyPr wrap="square"/>
           <a:lstStyle/>
           <a:p>
-            <a:pPr/>
             <a:endParaRPr lang="en-US" dirty="0"/>
           </a:p>
         </p:txBody>
@@ -2123,7 +2061,6 @@
           <a:bodyPr wrap="square"/>
           <a:lstStyle/>
           <a:p>
-            <a:pPr/>
             <a:fld id="{E1CC4C9C-B29E-4E68-9F89-CA7A1621DE94}" type="slidenum">
               <a:rPr lang="en-US" dirty="0"/>
               <a:t>‹#›</a:t>
@@ -2178,19 +2115,17 @@
           </a:ln>
         </p:spPr>
         <p:txBody>
-          <a:bodyPr anchor="b" wrap="square"/>
+          <a:bodyPr wrap="square" anchor="b"/>
           <a:lstStyle>
             <a:lvl1pPr>
               <a:defRPr sz="3200" dirty="0"/>
             </a:lvl1pPr>
           </a:lstStyle>
           <a:p>
-            <a:pPr/>
             <a:r>
               <a:rPr lang="en-US" dirty="0"/>
               <a:t>Click to edit Master title style</a:t>
             </a:r>
-            <a:endParaRPr lang="en-US" dirty="0"/>
           </a:p>
         </p:txBody>
       </p:sp>
@@ -2246,7 +2181,6 @@
             </a:lvl9pPr>
           </a:lstStyle>
           <a:p>
-            <a:pPr/>
             <a:r>
               <a:rPr lang="en-US" dirty="0"/>
               <a:t>Click to edit Master text styles</a:t>
@@ -2279,7 +2213,6 @@
               <a:rPr lang="en-US" dirty="0"/>
               <a:t>Fifth level</a:t>
             </a:r>
-            <a:endParaRPr lang="en-US" dirty="0"/>
           </a:p>
         </p:txBody>
       </p:sp>
@@ -2344,7 +2277,6 @@
             </a:lvl9pPr>
           </a:lstStyle>
           <a:p>
-            <a:pPr/>
             <a:r>
               <a:rPr lang="en-US" dirty="0"/>
               <a:t>Click to edit Master text styles</a:t>
@@ -2372,10 +2304,9 @@
           <a:bodyPr wrap="square"/>
           <a:lstStyle/>
           <a:p>
-            <a:pPr/>
             <a:fld id="{D4630D1D-EC81-4D12-BBAE-7AD5C46FE905}" type="datetimeFigureOut">
               <a:rPr lang="en-US" dirty="0"/>
-              <a:t>7/8/2015</a:t>
+              <a:t>5/12/2021</a:t>
             </a:fld>
             <a:endParaRPr lang="en-US" dirty="0"/>
           </a:p>
@@ -2401,7 +2332,6 @@
           <a:bodyPr wrap="square"/>
           <a:lstStyle/>
           <a:p>
-            <a:pPr/>
             <a:endParaRPr lang="en-US" dirty="0"/>
           </a:p>
         </p:txBody>
@@ -2426,7 +2356,6 @@
           <a:bodyPr wrap="square"/>
           <a:lstStyle/>
           <a:p>
-            <a:pPr/>
             <a:fld id="{E1CC4C9C-B29E-4E68-9F89-CA7A1621DE94}" type="slidenum">
               <a:rPr lang="en-US" dirty="0"/>
               <a:t>‹#›</a:t>
@@ -2481,19 +2410,17 @@
           </a:ln>
         </p:spPr>
         <p:txBody>
-          <a:bodyPr anchor="b" wrap="square"/>
+          <a:bodyPr wrap="square" anchor="b"/>
           <a:lstStyle>
             <a:lvl1pPr>
               <a:defRPr sz="3200" dirty="0"/>
             </a:lvl1pPr>
           </a:lstStyle>
           <a:p>
-            <a:pPr/>
             <a:r>
               <a:rPr lang="en-US" dirty="0"/>
               <a:t>Click to edit Master title style</a:t>
             </a:r>
-            <a:endParaRPr lang="en-US" dirty="0"/>
           </a:p>
         </p:txBody>
       </p:sp>
@@ -2558,7 +2485,6 @@
             </a:lvl9pPr>
           </a:lstStyle>
           <a:p>
-            <a:pPr/>
             <a:endParaRPr lang="en-US" dirty="0"/>
           </a:p>
         </p:txBody>
@@ -2624,7 +2550,6 @@
             </a:lvl9pPr>
           </a:lstStyle>
           <a:p>
-            <a:pPr/>
             <a:r>
               <a:rPr lang="en-US" dirty="0"/>
               <a:t>Click to edit Master text styles</a:t>
@@ -2652,10 +2577,9 @@
           <a:bodyPr wrap="square"/>
           <a:lstStyle/>
           <a:p>
-            <a:pPr/>
             <a:fld id="{D4630D1D-EC81-4D12-BBAE-7AD5C46FE905}" type="datetimeFigureOut">
               <a:rPr lang="en-US" dirty="0"/>
-              <a:t>7/8/2015</a:t>
+              <a:t>5/12/2021</a:t>
             </a:fld>
             <a:endParaRPr lang="en-US" dirty="0"/>
           </a:p>
@@ -2681,7 +2605,6 @@
           <a:bodyPr wrap="square"/>
           <a:lstStyle/>
           <a:p>
-            <a:pPr/>
             <a:endParaRPr lang="en-US" dirty="0"/>
           </a:p>
         </p:txBody>
@@ -2706,7 +2629,6 @@
           <a:bodyPr wrap="square"/>
           <a:lstStyle/>
           <a:p>
-            <a:pPr/>
             <a:fld id="{E1CC4C9C-B29E-4E68-9F89-CA7A1621DE94}" type="slidenum">
               <a:rPr lang="en-US" dirty="0"/>
               <a:t>‹#›</a:t>
@@ -2731,6 +2653,7 @@
         <a:solidFill>
           <a:schemeClr val="bg1"/>
         </a:solidFill>
+        <a:effectLst/>
       </p:bgPr>
     </p:bg>
     <p:spTree>
@@ -2771,17 +2694,15 @@
           </a:ln>
         </p:spPr>
         <p:txBody>
-          <a:bodyPr lIns="91440" tIns="45720" rIns="91440" bIns="45720" anchor="ctr" wrap="square">
+          <a:bodyPr wrap="square" lIns="91440" tIns="45720" rIns="91440" bIns="45720" anchor="ctr">
             <a:normAutofit/>
           </a:bodyPr>
           <a:lstStyle/>
           <a:p>
-            <a:pPr/>
             <a:r>
               <a:rPr lang="en-US" dirty="0"/>
               <a:t>Click to edit Master title style</a:t>
             </a:r>
-            <a:endParaRPr lang="en-US" dirty="0"/>
           </a:p>
         </p:txBody>
       </p:sp>
@@ -2809,12 +2730,11 @@
           </a:ln>
         </p:spPr>
         <p:txBody>
-          <a:bodyPr lIns="91440" tIns="45720" rIns="91440" bIns="45720" wrap="square">
+          <a:bodyPr wrap="square" lIns="91440" tIns="45720" rIns="91440" bIns="45720">
             <a:normAutofit/>
           </a:bodyPr>
           <a:lstStyle/>
           <a:p>
-            <a:pPr/>
             <a:r>
               <a:rPr lang="en-US" dirty="0"/>
               <a:t>Click to edit Master text styles</a:t>
@@ -2847,7 +2767,6 @@
               <a:rPr lang="en-US" dirty="0"/>
               <a:t>Fifth level</a:t>
             </a:r>
-            <a:endParaRPr lang="en-US" dirty="0"/>
           </a:p>
         </p:txBody>
       </p:sp>
@@ -2875,7 +2794,7 @@
           </a:ln>
         </p:spPr>
         <p:txBody>
-          <a:bodyPr lIns="91440" tIns="45720" rIns="91440" bIns="45720" anchor="ctr" wrap="square"/>
+          <a:bodyPr wrap="square" lIns="91440" tIns="45720" rIns="91440" bIns="45720" anchor="ctr"/>
           <a:lstStyle>
             <a:lvl1pPr algn="l">
               <a:defRPr sz="1200" dirty="0">
@@ -2888,10 +2807,9 @@
             </a:lvl1pPr>
           </a:lstStyle>
           <a:p>
-            <a:pPr/>
             <a:fld id="{D4630D1D-EC81-4D12-BBAE-7AD5C46FE905}" type="datetimeFigureOut">
               <a:rPr lang="en-US" dirty="0"/>
-              <a:t>7/8/2015</a:t>
+              <a:t>5/12/2021</a:t>
             </a:fld>
             <a:endParaRPr lang="en-US" dirty="0"/>
           </a:p>
@@ -2921,7 +2839,7 @@
           </a:ln>
         </p:spPr>
         <p:txBody>
-          <a:bodyPr lIns="91440" tIns="45720" rIns="91440" bIns="45720" anchor="ctr" wrap="square"/>
+          <a:bodyPr wrap="square" lIns="91440" tIns="45720" rIns="91440" bIns="45720" anchor="ctr"/>
           <a:lstStyle>
             <a:lvl1pPr algn="ctr">
               <a:defRPr sz="1200" dirty="0">
@@ -2934,7 +2852,6 @@
             </a:lvl1pPr>
           </a:lstStyle>
           <a:p>
-            <a:pPr/>
             <a:endParaRPr lang="en-US" dirty="0"/>
           </a:p>
         </p:txBody>
@@ -2963,7 +2880,7 @@
           </a:ln>
         </p:spPr>
         <p:txBody>
-          <a:bodyPr lIns="91440" tIns="45720" rIns="91440" bIns="45720" anchor="ctr" wrap="square"/>
+          <a:bodyPr wrap="square" lIns="91440" tIns="45720" rIns="91440" bIns="45720" anchor="ctr"/>
           <a:lstStyle>
             <a:lvl1pPr algn="r">
               <a:defRPr sz="1200" dirty="0">
@@ -2976,7 +2893,6 @@
             </a:lvl1pPr>
           </a:lstStyle>
           <a:p>
-            <a:pPr/>
             <a:fld id="{E1CC4C9C-B29E-4E68-9F89-CA7A1621DE94}" type="slidenum">
               <a:rPr lang="en-US" dirty="0"/>
               <a:t>‹#›</a:t>
@@ -3000,11 +2916,11 @@
     <p:sldLayoutId id="2147483657" r:id="rId9"/>
     <p:sldLayoutId id="2147483658" r:id="rId10"/>
     <p:sldLayoutId id="2147483659" r:id="rId11"/>
-    <p:sldLayoutId id="2147483660" r:id="rId13"/>
+    <p:sldLayoutId id="2147483660" r:id="rId12"/>
   </p:sldLayoutIdLst>
   <p:txStyles>
     <p:titleStyle>
-      <a:lvl1pPr rtl="0" algn="l" defTabSz="914400">
+      <a:lvl1pPr algn="l" defTabSz="914400" rtl="0">
         <a:lnSpc>
           <a:spcPct val="90000"/>
         </a:lnSpc>
@@ -3022,7 +2938,7 @@
       </a:lvl1pPr>
     </p:titleStyle>
     <p:bodyStyle>
-      <a:lvl1pPr marL="228600" indent="-228600" rtl="0" algn="l" defTabSz="914400">
+      <a:lvl1pPr marL="228600" indent="-228600" algn="l" defTabSz="914400" rtl="0">
         <a:lnSpc>
           <a:spcPct val="90000"/>
         </a:lnSpc>
@@ -3039,7 +2955,7 @@
           <a:ea typeface="+mn-ea"/>
         </a:defRPr>
       </a:lvl1pPr>
-      <a:lvl2pPr marL="685800" indent="-228600" rtl="0" algn="l" defTabSz="914400">
+      <a:lvl2pPr marL="685800" indent="-228600" algn="l" defTabSz="914400" rtl="0">
         <a:lnSpc>
           <a:spcPct val="90000"/>
         </a:lnSpc>
@@ -3056,7 +2972,7 @@
           <a:ea typeface="+mn-ea"/>
         </a:defRPr>
       </a:lvl2pPr>
-      <a:lvl3pPr marL="1143000" indent="-228600" rtl="0" algn="l" defTabSz="914400">
+      <a:lvl3pPr marL="1143000" indent="-228600" algn="l" defTabSz="914400" rtl="0">
         <a:lnSpc>
           <a:spcPct val="90000"/>
         </a:lnSpc>
@@ -3073,7 +2989,7 @@
           <a:ea typeface="+mn-ea"/>
         </a:defRPr>
       </a:lvl3pPr>
-      <a:lvl4pPr marL="1600200" indent="-228600" rtl="0" algn="l" defTabSz="914400">
+      <a:lvl4pPr marL="1600200" indent="-228600" algn="l" defTabSz="914400" rtl="0">
         <a:lnSpc>
           <a:spcPct val="90000"/>
         </a:lnSpc>
@@ -3090,7 +3006,7 @@
           <a:ea typeface="+mn-ea"/>
         </a:defRPr>
       </a:lvl4pPr>
-      <a:lvl5pPr marL="2057400" indent="-228600" rtl="0" algn="l" defTabSz="914400">
+      <a:lvl5pPr marL="2057400" indent="-228600" algn="l" defTabSz="914400" rtl="0">
         <a:lnSpc>
           <a:spcPct val="90000"/>
         </a:lnSpc>
@@ -3107,7 +3023,7 @@
           <a:ea typeface="+mn-ea"/>
         </a:defRPr>
       </a:lvl5pPr>
-      <a:lvl6pPr marL="2514600" indent="-228600" rtl="0" algn="l" defTabSz="914400">
+      <a:lvl6pPr marL="2514600" indent="-228600" algn="l" defTabSz="914400" rtl="0">
         <a:lnSpc>
           <a:spcPct val="90000"/>
         </a:lnSpc>
@@ -3124,7 +3040,7 @@
           <a:ea typeface="+mn-ea"/>
         </a:defRPr>
       </a:lvl6pPr>
-      <a:lvl7pPr marL="2971800" indent="-228600" rtl="0" algn="l" defTabSz="914400">
+      <a:lvl7pPr marL="2971800" indent="-228600" algn="l" defTabSz="914400" rtl="0">
         <a:lnSpc>
           <a:spcPct val="90000"/>
         </a:lnSpc>
@@ -3141,7 +3057,7 @@
           <a:ea typeface="+mn-ea"/>
         </a:defRPr>
       </a:lvl7pPr>
-      <a:lvl8pPr marL="3429000" indent="-228600" rtl="0" algn="l" defTabSz="914400">
+      <a:lvl8pPr marL="3429000" indent="-228600" algn="l" defTabSz="914400" rtl="0">
         <a:lnSpc>
           <a:spcPct val="90000"/>
         </a:lnSpc>
@@ -3158,7 +3074,7 @@
           <a:ea typeface="+mn-ea"/>
         </a:defRPr>
       </a:lvl8pPr>
-      <a:lvl9pPr marL="3886200" indent="-228600" rtl="0" algn="l" defTabSz="914400">
+      <a:lvl9pPr marL="3886200" indent="-228600" algn="l" defTabSz="914400" rtl="0">
         <a:lnSpc>
           <a:spcPct val="90000"/>
         </a:lnSpc>
@@ -3180,7 +3096,7 @@
       <a:defPPr defTabSz="914400">
         <a:defRPr lang="en-US" dirty="0"/>
       </a:defPPr>
-      <a:lvl1pPr marL="0" rtl="0" algn="l" defTabSz="914400">
+      <a:lvl1pPr marL="0" algn="l" defTabSz="914400" rtl="0">
         <a:defRPr sz="1800" kern="1200" dirty="0">
           <a:solidFill>
             <a:schemeClr val="tx1"/>
@@ -3189,7 +3105,7 @@
           <a:ea typeface="+mn-ea"/>
         </a:defRPr>
       </a:lvl1pPr>
-      <a:lvl2pPr marL="457200" rtl="0" algn="l" defTabSz="914400">
+      <a:lvl2pPr marL="457200" algn="l" defTabSz="914400" rtl="0">
         <a:defRPr sz="1800" kern="1200" dirty="0">
           <a:solidFill>
             <a:schemeClr val="tx1"/>
@@ -3198,7 +3114,7 @@
           <a:ea typeface="+mn-ea"/>
         </a:defRPr>
       </a:lvl2pPr>
-      <a:lvl3pPr marL="914400" rtl="0" algn="l" defTabSz="914400">
+      <a:lvl3pPr marL="914400" algn="l" defTabSz="914400" rtl="0">
         <a:defRPr sz="1800" kern="1200" dirty="0">
           <a:solidFill>
             <a:schemeClr val="tx1"/>
@@ -3207,7 +3123,7 @@
           <a:ea typeface="+mn-ea"/>
         </a:defRPr>
       </a:lvl3pPr>
-      <a:lvl4pPr marL="1371600" rtl="0" algn="l" defTabSz="914400">
+      <a:lvl4pPr marL="1371600" algn="l" defTabSz="914400" rtl="0">
         <a:defRPr sz="1800" kern="1200" dirty="0">
           <a:solidFill>
             <a:schemeClr val="tx1"/>
@@ -3216,7 +3132,7 @@
           <a:ea typeface="+mn-ea"/>
         </a:defRPr>
       </a:lvl4pPr>
-      <a:lvl5pPr marL="1828800" rtl="0" algn="l" defTabSz="914400">
+      <a:lvl5pPr marL="1828800" algn="l" defTabSz="914400" rtl="0">
         <a:defRPr sz="1800" kern="1200" dirty="0">
           <a:solidFill>
             <a:schemeClr val="tx1"/>
@@ -3225,7 +3141,7 @@
           <a:ea typeface="+mn-ea"/>
         </a:defRPr>
       </a:lvl5pPr>
-      <a:lvl6pPr marL="2286000" rtl="0" algn="l" defTabSz="914400">
+      <a:lvl6pPr marL="2286000" algn="l" defTabSz="914400" rtl="0">
         <a:defRPr sz="1800" kern="1200" dirty="0">
           <a:solidFill>
             <a:schemeClr val="tx1"/>
@@ -3234,7 +3150,7 @@
           <a:ea typeface="+mn-ea"/>
         </a:defRPr>
       </a:lvl6pPr>
-      <a:lvl7pPr marL="2743200" rtl="0" algn="l" defTabSz="914400">
+      <a:lvl7pPr marL="2743200" algn="l" defTabSz="914400" rtl="0">
         <a:defRPr sz="1800" kern="1200" dirty="0">
           <a:solidFill>
             <a:schemeClr val="tx1"/>
@@ -3243,7 +3159,7 @@
           <a:ea typeface="+mn-ea"/>
         </a:defRPr>
       </a:lvl7pPr>
-      <a:lvl8pPr marL="3200400" rtl="0" algn="l" defTabSz="914400">
+      <a:lvl8pPr marL="3200400" algn="l" defTabSz="914400" rtl="0">
         <a:defRPr sz="1800" kern="1200" dirty="0">
           <a:solidFill>
             <a:schemeClr val="tx1"/>
@@ -3252,7 +3168,7 @@
           <a:ea typeface="+mn-ea"/>
         </a:defRPr>
       </a:lvl8pPr>
-      <a:lvl9pPr marL="3657600" rtl="0" algn="l" defTabSz="914400">
+      <a:lvl9pPr marL="3657600" algn="l" defTabSz="914400" rtl="0">
         <a:defRPr sz="1800" kern="1200" dirty="0">
           <a:solidFill>
             <a:schemeClr val="tx1"/>
@@ -3292,9 +3208,9 @@
           <p:nvPr/>
         </p:nvSpPr>
         <p:spPr bwMode="white">
-          <a:xfrm rot="0">
+          <a:xfrm>
             <a:off x="0" y="0"/>
-            <a:ext cx="12192000" cy="6858000"/>
+            <a:ext cx="12192000" cy="1323439"/>
           </a:xfrm>
           <a:prstGeom prst="rect">
             <a:avLst/>
@@ -3317,7 +3233,7 @@
                   <a:srgbClr val="FFFFFF"/>
                 </a:solidFill>
               </a:rPr>
-              <a:t> dasds</a:t>
+              <a:t> </a:t>
             </a:r>
           </a:p>
         </p:txBody>
@@ -3331,7 +3247,7 @@
           <p:nvPr/>
         </p:nvSpPr>
         <p:spPr bwMode="white">
-          <a:xfrm rot="0">
+          <a:xfrm>
             <a:off x="3365500" y="6096000"/>
             <a:ext cx="5461000" cy="381000"/>
           </a:xfrm>
@@ -3344,7 +3260,7 @@
           </a:ln>
         </p:spPr>
         <p:txBody>
-          <a:bodyPr anchor="ctr" wrap="square">
+          <a:bodyPr wrap="square" anchor="ctr">
             <a:spAutoFit/>
           </a:bodyPr>
           <a:lstStyle/>
@@ -3397,9 +3313,9 @@
           <p:nvPr/>
         </p:nvSpPr>
         <p:spPr bwMode="white">
-          <a:xfrm rot="0">
+          <a:xfrm>
             <a:off x="0" y="0"/>
-            <a:ext cx="12192000" cy="6858000"/>
+            <a:ext cx="12192000" cy="2246769"/>
           </a:xfrm>
           <a:prstGeom prst="rect">
             <a:avLst/>
@@ -3424,10 +3340,7 @@
                 <a:latin typeface="Arial"/>
               </a:rPr>
               <a:t>
- asdas
-das
-d
-a sd</a:t>
+</a:t>
             </a:r>
           </a:p>
         </p:txBody>
@@ -3441,7 +3354,7 @@
           <p:nvPr/>
         </p:nvSpPr>
         <p:spPr bwMode="white">
-          <a:xfrm rot="0">
+          <a:xfrm>
             <a:off x="3365500" y="6096000"/>
             <a:ext cx="5461000" cy="381000"/>
           </a:xfrm>
@@ -3454,7 +3367,7 @@
           </a:ln>
         </p:spPr>
         <p:txBody>
-          <a:bodyPr anchor="ctr" wrap="square">
+          <a:bodyPr wrap="square" anchor="ctr">
             <a:spAutoFit/>
           </a:bodyPr>
           <a:lstStyle/>
@@ -3474,6 +3387,118 @@
         </p:txBody>
       </p:sp>
     </p:spTree>
+  </p:cSld>
+  <p:clrMapOvr>
+    <a:masterClrMapping/>
+  </p:clrMapOvr>
+</p:sld>
+</file>
+
+<file path=ppt/slides/slide3.xml><?xml version="1.0" encoding="utf-8"?>
+<p:sld xmlns:a="http://schemas.openxmlformats.org/drawingml/2006/main" xmlns:r="http://schemas.openxmlformats.org/officeDocument/2006/relationships" xmlns:p="http://schemas.openxmlformats.org/presentationml/2006/main">
+  <p:cSld>
+    <p:spTree>
+      <p:nvGrpSpPr>
+        <p:cNvPr id="1" name=""/>
+        <p:cNvGrpSpPr/>
+        <p:nvPr/>
+      </p:nvGrpSpPr>
+      <p:grpSpPr>
+        <a:xfrm>
+          <a:off x="0" y="0"/>
+          <a:ext cx="0" cy="0"/>
+          <a:chOff x="0" y="0"/>
+          <a:chExt cx="0" cy="0"/>
+        </a:xfrm>
+      </p:grpSpPr>
+      <p:sp>
+        <p:nvSpPr>
+          <p:cNvPr id="2" name="TextBox2"/>
+          <p:cNvSpPr txBox="1">
+            <a:spLocks noChangeArrowheads="1"/>
+          </p:cNvSpPr>
+          <p:nvPr/>
+        </p:nvSpPr>
+        <p:spPr bwMode="white">
+          <a:xfrm>
+            <a:off x="0" y="0"/>
+            <a:ext cx="12192000" cy="2246769"/>
+          </a:xfrm>
+          <a:prstGeom prst="rect">
+            <a:avLst/>
+          </a:prstGeom>
+          <a:ln>
+            <a:headEnd type="none"/>
+            <a:tailEnd type="none"/>
+          </a:ln>
+        </p:spPr>
+        <p:txBody>
+          <a:bodyPr wrap="square">
+            <a:spAutoFit/>
+          </a:bodyPr>
+          <a:lstStyle/>
+          <a:p>
+            <a:pPr algn="ctr" defTabSz="914400"/>
+            <a:r>
+              <a:rPr sz="7000" b="1" dirty="0">
+                <a:solidFill>
+                  <a:srgbClr val="FFFFFF"/>
+                </a:solidFill>
+                <a:latin typeface="Arial"/>
+              </a:rPr>
+              <a:t>
+</a:t>
+            </a:r>
+          </a:p>
+        </p:txBody>
+      </p:sp>
+      <p:sp>
+        <p:nvSpPr>
+          <p:cNvPr id="3" name="SyncfusionLicense"/>
+          <p:cNvSpPr txBox="1">
+            <a:spLocks noChangeArrowheads="1"/>
+          </p:cNvSpPr>
+          <p:nvPr/>
+        </p:nvSpPr>
+        <p:spPr bwMode="white">
+          <a:xfrm>
+            <a:off x="3365500" y="6096000"/>
+            <a:ext cx="5461000" cy="381000"/>
+          </a:xfrm>
+          <a:prstGeom prst="rect">
+            <a:avLst/>
+          </a:prstGeom>
+          <a:ln>
+            <a:headEnd type="none"/>
+            <a:tailEnd type="none"/>
+          </a:ln>
+        </p:spPr>
+        <p:txBody>
+          <a:bodyPr wrap="square" anchor="ctr">
+            <a:spAutoFit/>
+          </a:bodyPr>
+          <a:lstStyle/>
+          <a:p>
+            <a:pPr algn="ctr" defTabSz="914400">
+              <a:defRPr sz="1400" dirty="0"/>
+            </a:pPr>
+            <a:r>
+              <a:rPr dirty="0">
+                <a:solidFill>
+                  <a:srgbClr val="000000"/>
+                </a:solidFill>
+              </a:rPr>
+              <a:t>Created with a trial version of Syncfusion Essential Presentation</a:t>
+            </a:r>
+          </a:p>
+        </p:txBody>
+      </p:sp>
+    </p:spTree>
+    <p:extLst>
+      <p:ext uri="{BB962C8B-B14F-4D97-AF65-F5344CB8AC3E}">
+        <p14:creationId xmlns:p14="http://schemas.microsoft.com/office/powerpoint/2010/main" val="1427391599"/>
+      </p:ext>
+    </p:extLst>
   </p:cSld>
   <p:clrMapOvr>
     <a:masterClrMapping/>
@@ -3489,7 +3514,7 @@
         <a:srgbClr val="000000"/>
       </a:dk1>
       <a:lt1>
-        <a:srgbClr val="ffffff"/>
+        <a:srgbClr val="FFFFFF"/>
       </a:lt1>
       <a:dk2>
         <a:srgbClr val="44546A"/>
@@ -3738,5 +3763,7 @@
       </a:bgFillStyleLst>
     </a:fmtScheme>
   </a:themeElements>
+  <a:objectDefaults/>
+  <a:extraClrSchemeLst/>
 </a:theme>
 </file>
</xml_diff>